<commit_message>
Mockflows von Frank und Michael integriert
</commit_message>
<xml_diff>
--- a/Projektdokumentation/MockflowSoundmachine.pptx
+++ b/Projektdokumentation/MockflowSoundmachine.pptx
@@ -5,7 +5,7 @@
     <p:sldMasterId id="2147483648" r:id="rId1"/>
   </p:sldMasterIdLst>
   <p:notesMasterIdLst>
-    <p:notesMasterId r:id="rId8"/>
+    <p:notesMasterId r:id="rId13"/>
   </p:notesMasterIdLst>
   <p:sldIdLst>
     <p:sldId id="260" r:id="rId2"/>
@@ -13,7 +13,12 @@
     <p:sldId id="257" r:id="rId4"/>
     <p:sldId id="258" r:id="rId5"/>
     <p:sldId id="259" r:id="rId6"/>
-    <p:sldId id="261" r:id="rId7"/>
+    <p:sldId id="263" r:id="rId7"/>
+    <p:sldId id="264" r:id="rId8"/>
+    <p:sldId id="265" r:id="rId9"/>
+    <p:sldId id="266" r:id="rId10"/>
+    <p:sldId id="262" r:id="rId11"/>
+    <p:sldId id="261" r:id="rId12"/>
   </p:sldIdLst>
   <p:sldSz cx="12192000" cy="6858000"/>
   <p:notesSz cx="6858000" cy="9144000"/>
@@ -202,7 +207,7 @@
           <a:p>
             <a:fld id="{BB03B95D-1F27-404A-8AB0-D31C5A195DF7}" type="datetimeFigureOut">
               <a:rPr lang="de-DE" smtClean="0"/>
-              <a:t>23.01.2020</a:t>
+              <a:t>24.01.2020</a:t>
             </a:fld>
             <a:endParaRPr lang="de-DE"/>
           </a:p>
@@ -616,7 +621,7 @@
           <a:p>
             <a:fld id="{6FF4F2CD-A7E1-4390-9096-4FA17B00263D}" type="datetimeFigureOut">
               <a:rPr lang="de-DE" smtClean="0"/>
-              <a:t>23.01.2020</a:t>
+              <a:t>24.01.2020</a:t>
             </a:fld>
             <a:endParaRPr lang="de-DE"/>
           </a:p>
@@ -814,7 +819,7 @@
           <a:p>
             <a:fld id="{6FF4F2CD-A7E1-4390-9096-4FA17B00263D}" type="datetimeFigureOut">
               <a:rPr lang="de-DE" smtClean="0"/>
-              <a:t>23.01.2020</a:t>
+              <a:t>24.01.2020</a:t>
             </a:fld>
             <a:endParaRPr lang="de-DE"/>
           </a:p>
@@ -1022,7 +1027,7 @@
           <a:p>
             <a:fld id="{6FF4F2CD-A7E1-4390-9096-4FA17B00263D}" type="datetimeFigureOut">
               <a:rPr lang="de-DE" smtClean="0"/>
-              <a:t>23.01.2020</a:t>
+              <a:t>24.01.2020</a:t>
             </a:fld>
             <a:endParaRPr lang="de-DE"/>
           </a:p>
@@ -1220,7 +1225,7 @@
           <a:p>
             <a:fld id="{6FF4F2CD-A7E1-4390-9096-4FA17B00263D}" type="datetimeFigureOut">
               <a:rPr lang="de-DE" smtClean="0"/>
-              <a:t>23.01.2020</a:t>
+              <a:t>24.01.2020</a:t>
             </a:fld>
             <a:endParaRPr lang="de-DE"/>
           </a:p>
@@ -1495,7 +1500,7 @@
           <a:p>
             <a:fld id="{6FF4F2CD-A7E1-4390-9096-4FA17B00263D}" type="datetimeFigureOut">
               <a:rPr lang="de-DE" smtClean="0"/>
-              <a:t>23.01.2020</a:t>
+              <a:t>24.01.2020</a:t>
             </a:fld>
             <a:endParaRPr lang="de-DE"/>
           </a:p>
@@ -1760,7 +1765,7 @@
           <a:p>
             <a:fld id="{6FF4F2CD-A7E1-4390-9096-4FA17B00263D}" type="datetimeFigureOut">
               <a:rPr lang="de-DE" smtClean="0"/>
-              <a:t>23.01.2020</a:t>
+              <a:t>24.01.2020</a:t>
             </a:fld>
             <a:endParaRPr lang="de-DE"/>
           </a:p>
@@ -2172,7 +2177,7 @@
           <a:p>
             <a:fld id="{6FF4F2CD-A7E1-4390-9096-4FA17B00263D}" type="datetimeFigureOut">
               <a:rPr lang="de-DE" smtClean="0"/>
-              <a:t>23.01.2020</a:t>
+              <a:t>24.01.2020</a:t>
             </a:fld>
             <a:endParaRPr lang="de-DE"/>
           </a:p>
@@ -2313,7 +2318,7 @@
           <a:p>
             <a:fld id="{6FF4F2CD-A7E1-4390-9096-4FA17B00263D}" type="datetimeFigureOut">
               <a:rPr lang="de-DE" smtClean="0"/>
-              <a:t>23.01.2020</a:t>
+              <a:t>24.01.2020</a:t>
             </a:fld>
             <a:endParaRPr lang="de-DE"/>
           </a:p>
@@ -2338,9 +2343,13 @@
         <p:spPr/>
         <p:txBody>
           <a:bodyPr/>
-          <a:lstStyle/>
-          <a:p>
-            <a:endParaRPr lang="de-DE"/>
+          <a:lstStyle>
+            <a:lvl1pPr>
+              <a:defRPr sz="1600"/>
+            </a:lvl1pPr>
+          </a:lstStyle>
+          <a:p>
+            <a:endParaRPr lang="de-DE" dirty="0"/>
           </a:p>
         </p:txBody>
       </p:sp>
@@ -2426,7 +2435,7 @@
           <a:p>
             <a:fld id="{6FF4F2CD-A7E1-4390-9096-4FA17B00263D}" type="datetimeFigureOut">
               <a:rPr lang="de-DE" smtClean="0"/>
-              <a:t>23.01.2020</a:t>
+              <a:t>24.01.2020</a:t>
             </a:fld>
             <a:endParaRPr lang="de-DE"/>
           </a:p>
@@ -2737,7 +2746,7 @@
           <a:p>
             <a:fld id="{6FF4F2CD-A7E1-4390-9096-4FA17B00263D}" type="datetimeFigureOut">
               <a:rPr lang="de-DE" smtClean="0"/>
-              <a:t>23.01.2020</a:t>
+              <a:t>24.01.2020</a:t>
             </a:fld>
             <a:endParaRPr lang="de-DE"/>
           </a:p>
@@ -3025,7 +3034,7 @@
           <a:p>
             <a:fld id="{6FF4F2CD-A7E1-4390-9096-4FA17B00263D}" type="datetimeFigureOut">
               <a:rPr lang="de-DE" smtClean="0"/>
-              <a:t>23.01.2020</a:t>
+              <a:t>24.01.2020</a:t>
             </a:fld>
             <a:endParaRPr lang="de-DE"/>
           </a:p>
@@ -3266,7 +3275,7 @@
           <a:p>
             <a:fld id="{6FF4F2CD-A7E1-4390-9096-4FA17B00263D}" type="datetimeFigureOut">
               <a:rPr lang="de-DE" smtClean="0"/>
-              <a:t>23.01.2020</a:t>
+              <a:t>24.01.2020</a:t>
             </a:fld>
             <a:endParaRPr lang="de-DE"/>
           </a:p>
@@ -4782,6 +4791,642 @@
 </p:sld>
 </file>
 
+<file path=ppt/slides/slide10.xml><?xml version="1.0" encoding="utf-8"?>
+<p:sld xmlns:a="http://schemas.openxmlformats.org/drawingml/2006/main" xmlns:r="http://schemas.openxmlformats.org/officeDocument/2006/relationships" xmlns:p="http://schemas.openxmlformats.org/presentationml/2006/main">
+  <p:cSld>
+    <p:spTree>
+      <p:nvGrpSpPr>
+        <p:cNvPr id="1" name=""/>
+        <p:cNvGrpSpPr/>
+        <p:nvPr/>
+      </p:nvGrpSpPr>
+      <p:grpSpPr>
+        <a:xfrm>
+          <a:off x="0" y="0"/>
+          <a:ext cx="0" cy="0"/>
+          <a:chOff x="0" y="0"/>
+          <a:chExt cx="0" cy="0"/>
+        </a:xfrm>
+      </p:grpSpPr>
+      <p:sp>
+        <p:nvSpPr>
+          <p:cNvPr id="2" name="Titel 1">
+            <a:extLst>
+              <a:ext uri="{FF2B5EF4-FFF2-40B4-BE49-F238E27FC236}">
+                <a16:creationId xmlns:a16="http://schemas.microsoft.com/office/drawing/2014/main" id="{13A6002A-CE1E-4A2F-B688-293FA73DE205}"/>
+              </a:ext>
+            </a:extLst>
+          </p:cNvPr>
+          <p:cNvSpPr>
+            <a:spLocks noGrp="1"/>
+          </p:cNvSpPr>
+          <p:nvPr>
+            <p:ph type="title"/>
+          </p:nvPr>
+        </p:nvSpPr>
+        <p:spPr/>
+        <p:txBody>
+          <a:bodyPr/>
+          <a:lstStyle/>
+          <a:p>
+            <a:r>
+              <a:rPr lang="de-DE" dirty="0"/>
+              <a:t>Backup</a:t>
+            </a:r>
+          </a:p>
+        </p:txBody>
+      </p:sp>
+    </p:spTree>
+    <p:extLst>
+      <p:ext uri="{BB962C8B-B14F-4D97-AF65-F5344CB8AC3E}">
+        <p14:creationId xmlns:p14="http://schemas.microsoft.com/office/powerpoint/2010/main" val="3709637875"/>
+      </p:ext>
+    </p:extLst>
+  </p:cSld>
+  <p:clrMapOvr>
+    <a:masterClrMapping/>
+  </p:clrMapOvr>
+</p:sld>
+</file>
+
+<file path=ppt/slides/slide11.xml><?xml version="1.0" encoding="utf-8"?>
+<p:sld xmlns:a="http://schemas.openxmlformats.org/drawingml/2006/main" xmlns:r="http://schemas.openxmlformats.org/officeDocument/2006/relationships" xmlns:p="http://schemas.openxmlformats.org/presentationml/2006/main">
+  <p:cSld>
+    <p:spTree>
+      <p:nvGrpSpPr>
+        <p:cNvPr id="1" name=""/>
+        <p:cNvGrpSpPr/>
+        <p:nvPr/>
+      </p:nvGrpSpPr>
+      <p:grpSpPr>
+        <a:xfrm>
+          <a:off x="0" y="0"/>
+          <a:ext cx="0" cy="0"/>
+          <a:chOff x="0" y="0"/>
+          <a:chExt cx="0" cy="0"/>
+        </a:xfrm>
+      </p:grpSpPr>
+      <p:sp>
+        <p:nvSpPr>
+          <p:cNvPr id="6" name="Textfeld 5">
+            <a:extLst>
+              <a:ext uri="{FF2B5EF4-FFF2-40B4-BE49-F238E27FC236}">
+                <a16:creationId xmlns:a16="http://schemas.microsoft.com/office/drawing/2014/main" id="{E8F2A78A-3BB3-47BC-B3F0-4CD9299A609E}"/>
+              </a:ext>
+            </a:extLst>
+          </p:cNvPr>
+          <p:cNvSpPr txBox="1"/>
+          <p:nvPr/>
+        </p:nvSpPr>
+        <p:spPr>
+          <a:xfrm>
+            <a:off x="1073426" y="1421296"/>
+            <a:ext cx="10280374" cy="3970318"/>
+          </a:xfrm>
+          <a:prstGeom prst="rect">
+            <a:avLst/>
+          </a:prstGeom>
+          <a:noFill/>
+        </p:spPr>
+        <p:txBody>
+          <a:bodyPr wrap="square" rtlCol="0">
+            <a:spAutoFit/>
+          </a:bodyPr>
+          <a:lstStyle/>
+          <a:p>
+            <a:r>
+              <a:rPr lang="de-DE" dirty="0"/>
+              <a:t>Willkommen Stefan!</a:t>
+            </a:r>
+          </a:p>
+          <a:p>
+            <a:endParaRPr lang="de-DE" dirty="0"/>
+          </a:p>
+          <a:p>
+            <a:r>
+              <a:rPr lang="de-DE" dirty="0" err="1"/>
+              <a:t>Lorem</a:t>
+            </a:r>
+            <a:r>
+              <a:rPr lang="de-DE" dirty="0"/>
+              <a:t> </a:t>
+            </a:r>
+            <a:r>
+              <a:rPr lang="de-DE" dirty="0" err="1"/>
+              <a:t>ipsum</a:t>
+            </a:r>
+            <a:r>
+              <a:rPr lang="de-DE" dirty="0"/>
+              <a:t> </a:t>
+            </a:r>
+            <a:r>
+              <a:rPr lang="de-DE" dirty="0" err="1"/>
+              <a:t>dolor</a:t>
+            </a:r>
+            <a:r>
+              <a:rPr lang="de-DE" dirty="0"/>
+              <a:t> </a:t>
+            </a:r>
+            <a:r>
+              <a:rPr lang="de-DE" dirty="0" err="1"/>
+              <a:t>sit</a:t>
+            </a:r>
+            <a:r>
+              <a:rPr lang="de-DE" dirty="0"/>
+              <a:t> </a:t>
+            </a:r>
+            <a:r>
+              <a:rPr lang="de-DE" dirty="0" err="1"/>
+              <a:t>amet</a:t>
+            </a:r>
+            <a:r>
+              <a:rPr lang="de-DE" dirty="0"/>
+              <a:t>, </a:t>
+            </a:r>
+            <a:r>
+              <a:rPr lang="de-DE" dirty="0" err="1"/>
+              <a:t>consetetur</a:t>
+            </a:r>
+            <a:r>
+              <a:rPr lang="de-DE" dirty="0"/>
+              <a:t> </a:t>
+            </a:r>
+            <a:r>
+              <a:rPr lang="de-DE" dirty="0" err="1"/>
+              <a:t>sadipscing</a:t>
+            </a:r>
+            <a:r>
+              <a:rPr lang="de-DE" dirty="0"/>
+              <a:t> </a:t>
+            </a:r>
+            <a:r>
+              <a:rPr lang="de-DE" dirty="0" err="1"/>
+              <a:t>elitr</a:t>
+            </a:r>
+            <a:r>
+              <a:rPr lang="de-DE" dirty="0"/>
+              <a:t>, sed </a:t>
+            </a:r>
+            <a:r>
+              <a:rPr lang="de-DE" dirty="0" err="1"/>
+              <a:t>diam</a:t>
+            </a:r>
+            <a:r>
+              <a:rPr lang="de-DE" dirty="0"/>
+              <a:t> </a:t>
+            </a:r>
+            <a:r>
+              <a:rPr lang="de-DE" dirty="0" err="1"/>
+              <a:t>nonumy</a:t>
+            </a:r>
+            <a:r>
+              <a:rPr lang="de-DE" dirty="0"/>
+              <a:t> </a:t>
+            </a:r>
+            <a:r>
+              <a:rPr lang="de-DE" dirty="0" err="1"/>
+              <a:t>eirmod</a:t>
+            </a:r>
+            <a:r>
+              <a:rPr lang="de-DE" dirty="0"/>
+              <a:t> </a:t>
+            </a:r>
+            <a:r>
+              <a:rPr lang="de-DE" dirty="0" err="1"/>
+              <a:t>tempor</a:t>
+            </a:r>
+            <a:r>
+              <a:rPr lang="de-DE" dirty="0"/>
+              <a:t> </a:t>
+            </a:r>
+            <a:r>
+              <a:rPr lang="de-DE" dirty="0" err="1"/>
+              <a:t>invidunt</a:t>
+            </a:r>
+            <a:r>
+              <a:rPr lang="de-DE" dirty="0"/>
+              <a:t> </a:t>
+            </a:r>
+            <a:r>
+              <a:rPr lang="de-DE" dirty="0" err="1"/>
+              <a:t>ut</a:t>
+            </a:r>
+            <a:r>
+              <a:rPr lang="de-DE" dirty="0"/>
+              <a:t> </a:t>
+            </a:r>
+            <a:r>
+              <a:rPr lang="de-DE" dirty="0" err="1"/>
+              <a:t>labore</a:t>
+            </a:r>
+            <a:r>
+              <a:rPr lang="de-DE" dirty="0"/>
+              <a:t> et </a:t>
+            </a:r>
+            <a:r>
+              <a:rPr lang="de-DE" dirty="0" err="1"/>
+              <a:t>dolore</a:t>
+            </a:r>
+            <a:r>
+              <a:rPr lang="de-DE" dirty="0"/>
+              <a:t> magna </a:t>
+            </a:r>
+            <a:r>
+              <a:rPr lang="de-DE" dirty="0" err="1"/>
+              <a:t>aliquyam</a:t>
+            </a:r>
+            <a:r>
+              <a:rPr lang="de-DE" dirty="0"/>
+              <a:t> </a:t>
+            </a:r>
+            <a:r>
+              <a:rPr lang="de-DE" dirty="0" err="1"/>
+              <a:t>erat</a:t>
+            </a:r>
+            <a:r>
+              <a:rPr lang="de-DE" dirty="0"/>
+              <a:t>, sed </a:t>
+            </a:r>
+            <a:r>
+              <a:rPr lang="de-DE" dirty="0" err="1"/>
+              <a:t>diam</a:t>
+            </a:r>
+            <a:r>
+              <a:rPr lang="de-DE" dirty="0"/>
+              <a:t> </a:t>
+            </a:r>
+            <a:r>
+              <a:rPr lang="de-DE" dirty="0" err="1"/>
+              <a:t>voluptua</a:t>
+            </a:r>
+            <a:r>
+              <a:rPr lang="de-DE" dirty="0"/>
+              <a:t>. At </a:t>
+            </a:r>
+            <a:r>
+              <a:rPr lang="de-DE" dirty="0" err="1"/>
+              <a:t>vero</a:t>
+            </a:r>
+            <a:r>
+              <a:rPr lang="de-DE" dirty="0"/>
+              <a:t> </a:t>
+            </a:r>
+            <a:r>
+              <a:rPr lang="de-DE" dirty="0" err="1"/>
+              <a:t>eos</a:t>
+            </a:r>
+            <a:r>
+              <a:rPr lang="de-DE" dirty="0"/>
+              <a:t> et </a:t>
+            </a:r>
+            <a:r>
+              <a:rPr lang="de-DE" dirty="0" err="1"/>
+              <a:t>accusam</a:t>
+            </a:r>
+            <a:r>
+              <a:rPr lang="de-DE" dirty="0"/>
+              <a:t> et </a:t>
+            </a:r>
+            <a:r>
+              <a:rPr lang="de-DE" dirty="0" err="1"/>
+              <a:t>justo</a:t>
+            </a:r>
+            <a:r>
+              <a:rPr lang="de-DE" dirty="0"/>
+              <a:t> </a:t>
+            </a:r>
+            <a:r>
+              <a:rPr lang="de-DE" dirty="0" err="1"/>
+              <a:t>duo</a:t>
+            </a:r>
+            <a:r>
+              <a:rPr lang="de-DE" dirty="0"/>
+              <a:t> </a:t>
+            </a:r>
+            <a:r>
+              <a:rPr lang="de-DE" dirty="0" err="1"/>
+              <a:t>dolores</a:t>
+            </a:r>
+            <a:r>
+              <a:rPr lang="de-DE" dirty="0"/>
+              <a:t> et </a:t>
+            </a:r>
+            <a:r>
+              <a:rPr lang="de-DE" dirty="0" err="1"/>
+              <a:t>ea</a:t>
+            </a:r>
+            <a:r>
+              <a:rPr lang="de-DE" dirty="0"/>
+              <a:t> </a:t>
+            </a:r>
+            <a:r>
+              <a:rPr lang="de-DE" dirty="0" err="1"/>
+              <a:t>rebum</a:t>
+            </a:r>
+            <a:r>
+              <a:rPr lang="de-DE" dirty="0"/>
+              <a:t>. </a:t>
+            </a:r>
+          </a:p>
+          <a:p>
+            <a:endParaRPr lang="de-DE" dirty="0"/>
+          </a:p>
+          <a:p>
+            <a:r>
+              <a:rPr lang="de-DE" dirty="0"/>
+              <a:t>Geschlecht: 	Mann</a:t>
+            </a:r>
+          </a:p>
+          <a:p>
+            <a:r>
+              <a:rPr lang="de-DE" dirty="0"/>
+              <a:t>Nachname:	Mustermann</a:t>
+            </a:r>
+          </a:p>
+          <a:p>
+            <a:r>
+              <a:rPr lang="de-DE" dirty="0"/>
+              <a:t>Geburtsdatum:	01.01.2000</a:t>
+            </a:r>
+          </a:p>
+          <a:p>
+            <a:r>
+              <a:rPr lang="de-DE" dirty="0"/>
+              <a:t>Standort: 	53227 Bonn</a:t>
+            </a:r>
+          </a:p>
+          <a:p>
+            <a:r>
+              <a:rPr lang="de-DE" dirty="0"/>
+              <a:t>Email:		</a:t>
+            </a:r>
+            <a:r>
+              <a:rPr lang="de-DE" dirty="0">
+                <a:hlinkClick r:id="rId2"/>
+              </a:rPr>
+              <a:t>email@acdc.com</a:t>
+            </a:r>
+            <a:endParaRPr lang="de-DE" dirty="0"/>
+          </a:p>
+          <a:p>
+            <a:r>
+              <a:rPr lang="de-DE" dirty="0"/>
+              <a:t>Telefon:		+49 171 …</a:t>
+            </a:r>
+          </a:p>
+          <a:p>
+            <a:r>
+              <a:rPr lang="de-DE" dirty="0"/>
+              <a:t>Lieblings-Genre:	Schlager, Pop</a:t>
+            </a:r>
+          </a:p>
+          <a:p>
+            <a:r>
+              <a:rPr lang="de-DE" dirty="0"/>
+              <a:t>Instrumente:	Gitarre, Schlagzeug</a:t>
+            </a:r>
+          </a:p>
+          <a:p>
+            <a:r>
+              <a:rPr lang="de-DE" dirty="0"/>
+              <a:t>Benutzername:	</a:t>
+            </a:r>
+            <a:r>
+              <a:rPr lang="de-DE" dirty="0" err="1"/>
+              <a:t>stefanm</a:t>
+            </a:r>
+            <a:endParaRPr lang="de-DE" dirty="0"/>
+          </a:p>
+        </p:txBody>
+      </p:sp>
+      <p:sp>
+        <p:nvSpPr>
+          <p:cNvPr id="10" name="Titel 3">
+            <a:extLst>
+              <a:ext uri="{FF2B5EF4-FFF2-40B4-BE49-F238E27FC236}">
+                <a16:creationId xmlns:a16="http://schemas.microsoft.com/office/drawing/2014/main" id="{CD42BD10-E45A-4122-AE6B-A3A03B39331B}"/>
+              </a:ext>
+            </a:extLst>
+          </p:cNvPr>
+          <p:cNvSpPr txBox="1">
+            <a:spLocks/>
+          </p:cNvSpPr>
+          <p:nvPr/>
+        </p:nvSpPr>
+        <p:spPr>
+          <a:xfrm>
+            <a:off x="838200" y="365126"/>
+            <a:ext cx="10515600" cy="837510"/>
+          </a:xfrm>
+          <a:prstGeom prst="rect">
+            <a:avLst/>
+          </a:prstGeom>
+          <a:ln>
+            <a:solidFill>
+              <a:schemeClr val="tx1"/>
+            </a:solidFill>
+          </a:ln>
+        </p:spPr>
+        <p:txBody>
+          <a:bodyPr vert="horz" lIns="91440" tIns="45720" rIns="91440" bIns="45720" rtlCol="0" anchor="ctr">
+            <a:normAutofit/>
+          </a:bodyPr>
+          <a:lstStyle>
+            <a:lvl1pPr algn="l" defTabSz="914400" rtl="0" eaLnBrk="1" latinLnBrk="0" hangingPunct="1">
+              <a:lnSpc>
+                <a:spcPct val="90000"/>
+              </a:lnSpc>
+              <a:spcBef>
+                <a:spcPct val="0"/>
+              </a:spcBef>
+              <a:buNone/>
+              <a:defRPr sz="4400" kern="1200">
+                <a:solidFill>
+                  <a:schemeClr val="tx1"/>
+                </a:solidFill>
+                <a:latin typeface="+mj-lt"/>
+                <a:ea typeface="+mj-ea"/>
+                <a:cs typeface="+mj-cs"/>
+              </a:defRPr>
+            </a:lvl1pPr>
+          </a:lstStyle>
+          <a:p>
+            <a:pPr>
+              <a:tabLst>
+                <a:tab pos="2238375" algn="l"/>
+                <a:tab pos="4130675" algn="l"/>
+                <a:tab pos="7893050" algn="l"/>
+                <a:tab pos="10310813" algn="l"/>
+              </a:tabLst>
+            </a:pPr>
+            <a:r>
+              <a:rPr lang="de-DE" sz="2800" dirty="0"/>
+              <a:t>Home	Bands		</a:t>
+            </a:r>
+            <a:r>
+              <a:rPr lang="de-DE" sz="2800" dirty="0">
+                <a:solidFill>
+                  <a:schemeClr val="bg1">
+                    <a:lumMod val="50000"/>
+                  </a:schemeClr>
+                </a:solidFill>
+              </a:rPr>
+              <a:t>Benutzerprofil</a:t>
+            </a:r>
+          </a:p>
+        </p:txBody>
+      </p:sp>
+      <p:sp>
+        <p:nvSpPr>
+          <p:cNvPr id="3" name="Fußzeilenplatzhalter 2">
+            <a:extLst>
+              <a:ext uri="{FF2B5EF4-FFF2-40B4-BE49-F238E27FC236}">
+                <a16:creationId xmlns:a16="http://schemas.microsoft.com/office/drawing/2014/main" id="{D4391303-0FCA-461B-B584-6E135E23A8A6}"/>
+              </a:ext>
+            </a:extLst>
+          </p:cNvPr>
+          <p:cNvSpPr>
+            <a:spLocks noGrp="1"/>
+          </p:cNvSpPr>
+          <p:nvPr>
+            <p:ph type="ftr" sz="quarter" idx="11"/>
+          </p:nvPr>
+        </p:nvSpPr>
+        <p:spPr/>
+        <p:txBody>
+          <a:bodyPr/>
+          <a:lstStyle/>
+          <a:p>
+            <a:r>
+              <a:rPr lang="de-DE" dirty="0"/>
+              <a:t>Benutzerprofil anzeigen</a:t>
+            </a:r>
+          </a:p>
+        </p:txBody>
+      </p:sp>
+      <p:sp>
+        <p:nvSpPr>
+          <p:cNvPr id="8" name="Rechteck: abgerundete Ecken 7">
+            <a:extLst>
+              <a:ext uri="{FF2B5EF4-FFF2-40B4-BE49-F238E27FC236}">
+                <a16:creationId xmlns:a16="http://schemas.microsoft.com/office/drawing/2014/main" id="{56682BFF-6128-4135-B049-005BAB044BF2}"/>
+              </a:ext>
+            </a:extLst>
+          </p:cNvPr>
+          <p:cNvSpPr/>
+          <p:nvPr/>
+        </p:nvSpPr>
+        <p:spPr>
+          <a:xfrm>
+            <a:off x="9246704" y="6163875"/>
+            <a:ext cx="2107096" cy="437322"/>
+          </a:xfrm>
+          <a:prstGeom prst="roundRect">
+            <a:avLst/>
+          </a:prstGeom>
+        </p:spPr>
+        <p:style>
+          <a:lnRef idx="2">
+            <a:schemeClr val="accent6"/>
+          </a:lnRef>
+          <a:fillRef idx="1">
+            <a:schemeClr val="lt1"/>
+          </a:fillRef>
+          <a:effectRef idx="0">
+            <a:schemeClr val="accent6"/>
+          </a:effectRef>
+          <a:fontRef idx="minor">
+            <a:schemeClr val="dk1"/>
+          </a:fontRef>
+        </p:style>
+        <p:txBody>
+          <a:bodyPr rtlCol="0" anchor="ctr"/>
+          <a:lstStyle/>
+          <a:p>
+            <a:pPr algn="ctr"/>
+            <a:r>
+              <a:rPr lang="de-DE" dirty="0"/>
+              <a:t>Edit</a:t>
+            </a:r>
+          </a:p>
+        </p:txBody>
+      </p:sp>
+      <p:sp>
+        <p:nvSpPr>
+          <p:cNvPr id="2" name="Textfeld 1">
+            <a:extLst>
+              <a:ext uri="{FF2B5EF4-FFF2-40B4-BE49-F238E27FC236}">
+                <a16:creationId xmlns:a16="http://schemas.microsoft.com/office/drawing/2014/main" id="{9885A64D-C879-42D2-B5FB-439928EDC748}"/>
+              </a:ext>
+            </a:extLst>
+          </p:cNvPr>
+          <p:cNvSpPr txBox="1"/>
+          <p:nvPr/>
+        </p:nvSpPr>
+        <p:spPr>
+          <a:xfrm>
+            <a:off x="1073426" y="5391614"/>
+            <a:ext cx="3657600" cy="923330"/>
+          </a:xfrm>
+          <a:prstGeom prst="rect">
+            <a:avLst/>
+          </a:prstGeom>
+          <a:noFill/>
+        </p:spPr>
+        <p:txBody>
+          <a:bodyPr wrap="square" rtlCol="0">
+            <a:spAutoFit/>
+          </a:bodyPr>
+          <a:lstStyle/>
+          <a:p>
+            <a:r>
+              <a:rPr lang="de-DE" dirty="0"/>
+              <a:t>Meine Bands:</a:t>
+            </a:r>
+          </a:p>
+          <a:p>
+            <a:pPr marL="285750" indent="-285750">
+              <a:buFont typeface="Arial" panose="020B0604020202020204" pitchFamily="34" charset="0"/>
+              <a:buChar char="•"/>
+            </a:pPr>
+            <a:r>
+              <a:rPr lang="de-DE" u="sng" dirty="0">
+                <a:solidFill>
+                  <a:schemeClr val="accent1">
+                    <a:lumMod val="50000"/>
+                  </a:schemeClr>
+                </a:solidFill>
+              </a:rPr>
+              <a:t>ACDC</a:t>
+            </a:r>
+          </a:p>
+          <a:p>
+            <a:r>
+              <a:rPr lang="de-DE" u="sng" dirty="0">
+                <a:solidFill>
+                  <a:schemeClr val="accent1">
+                    <a:lumMod val="50000"/>
+                  </a:schemeClr>
+                </a:solidFill>
+              </a:rPr>
+              <a:t>Neue Band anlegen</a:t>
+            </a:r>
+          </a:p>
+        </p:txBody>
+      </p:sp>
+    </p:spTree>
+    <p:extLst>
+      <p:ext uri="{BB962C8B-B14F-4D97-AF65-F5344CB8AC3E}">
+        <p14:creationId xmlns:p14="http://schemas.microsoft.com/office/powerpoint/2010/main" val="2944483094"/>
+      </p:ext>
+    </p:extLst>
+  </p:cSld>
+  <p:clrMapOvr>
+    <a:masterClrMapping/>
+  </p:clrMapOvr>
+</p:sld>
+</file>
+
 <file path=ppt/slides/slide2.xml><?xml version="1.0" encoding="utf-8"?>
 <p:sld xmlns:a="http://schemas.openxmlformats.org/drawingml/2006/main" xmlns:r="http://schemas.openxmlformats.org/officeDocument/2006/relationships" xmlns:p="http://schemas.openxmlformats.org/presentationml/2006/main">
   <p:cSld>
@@ -4852,8 +5497,35 @@
             </a:r>
             <a:r>
               <a:rPr lang="de-DE" sz="2800" dirty="0"/>
-              <a:t>	Bands		Register/Login</a:t>
-            </a:r>
+              <a:t>	</a:t>
+            </a:r>
+            <a:r>
+              <a:rPr lang="de-DE" sz="2800" dirty="0">
+                <a:hlinkClick r:id="rId2" action="ppaction://hlinksldjump"/>
+              </a:rPr>
+              <a:t>Bands</a:t>
+            </a:r>
+            <a:r>
+              <a:rPr lang="de-DE" sz="2800" dirty="0"/>
+              <a:t>		</a:t>
+            </a:r>
+            <a:r>
+              <a:rPr lang="de-DE" sz="2800" dirty="0">
+                <a:hlinkClick r:id="rId3" action="ppaction://hlinksldjump"/>
+              </a:rPr>
+              <a:t>Register</a:t>
+            </a:r>
+            <a:r>
+              <a:rPr lang="de-DE" sz="2800" dirty="0"/>
+              <a:t>/</a:t>
+            </a:r>
+            <a:r>
+              <a:rPr lang="de-DE" sz="2800" dirty="0">
+                <a:hlinkClick r:id="rId4" action="ppaction://hlinksldjump"/>
+              </a:rPr>
+              <a:t>Login</a:t>
+            </a:r>
+            <a:endParaRPr lang="de-DE" sz="2800" dirty="0"/>
           </a:p>
         </p:txBody>
       </p:sp>
@@ -4922,6 +5594,7 @@
                     <a:lumMod val="75000"/>
                   </a:schemeClr>
                 </a:solidFill>
+                <a:hlinkClick r:id="rId5" action="ppaction://hlinksldjump"/>
               </a:rPr>
               <a:t>ACDC</a:t>
             </a:r>
@@ -6130,6 +6803,7 @@
       <p:sp>
         <p:nvSpPr>
           <p:cNvPr id="8" name="Rechteck: abgerundete Ecken 7">
+            <a:hlinkClick r:id="rId3" action="ppaction://hlinksldjump"/>
             <a:extLst>
               <a:ext uri="{FF2B5EF4-FFF2-40B4-BE49-F238E27FC236}">
                 <a16:creationId xmlns:a16="http://schemas.microsoft.com/office/drawing/2014/main" id="{56682BFF-6128-4135-B049-005BAB044BF2}"/>
@@ -6209,9 +6883,17 @@
                     <a:lumMod val="75000"/>
                   </a:schemeClr>
                 </a:solidFill>
+                <a:hlinkClick r:id="rId4" action="ppaction://hlinksldjump"/>
               </a:rPr>
               <a:t>Zurück zur Bandliste</a:t>
             </a:r>
+            <a:endParaRPr lang="de-DE" u="sng" dirty="0">
+              <a:solidFill>
+                <a:schemeClr val="accent1">
+                  <a:lumMod val="75000"/>
+                </a:schemeClr>
+              </a:solidFill>
+            </a:endParaRPr>
           </a:p>
         </p:txBody>
       </p:sp>
@@ -6260,7 +6942,7 @@
         <p:spPr>
           <a:xfrm>
             <a:off x="1073426" y="1421296"/>
-            <a:ext cx="9740348" cy="4619854"/>
+            <a:ext cx="2098071" cy="4024307"/>
           </a:xfrm>
           <a:prstGeom prst="rect">
             <a:avLst/>
@@ -6275,7 +6957,7 @@
           <a:p>
             <a:pPr>
               <a:lnSpc>
-                <a:spcPct val="150000"/>
+                <a:spcPct val="130000"/>
               </a:lnSpc>
             </a:pPr>
             <a:r>
@@ -6286,7 +6968,7 @@
           <a:p>
             <a:pPr>
               <a:lnSpc>
-                <a:spcPct val="150000"/>
+                <a:spcPct val="130000"/>
               </a:lnSpc>
             </a:pPr>
             <a:r>
@@ -6297,7 +6979,7 @@
           <a:p>
             <a:pPr>
               <a:lnSpc>
-                <a:spcPct val="150000"/>
+                <a:spcPct val="130000"/>
               </a:lnSpc>
             </a:pPr>
             <a:r>
@@ -6308,7 +6990,7 @@
           <a:p>
             <a:pPr>
               <a:lnSpc>
-                <a:spcPct val="150000"/>
+                <a:spcPct val="130000"/>
               </a:lnSpc>
             </a:pPr>
             <a:r>
@@ -6319,7 +7001,7 @@
           <a:p>
             <a:pPr>
               <a:lnSpc>
-                <a:spcPct val="150000"/>
+                <a:spcPct val="130000"/>
               </a:lnSpc>
             </a:pPr>
             <a:r>
@@ -6330,7 +7012,7 @@
           <a:p>
             <a:pPr>
               <a:lnSpc>
-                <a:spcPct val="150000"/>
+                <a:spcPct val="130000"/>
               </a:lnSpc>
             </a:pPr>
             <a:r>
@@ -6341,7 +7023,7 @@
           <a:p>
             <a:pPr marL="285750" indent="-285750">
               <a:lnSpc>
-                <a:spcPct val="150000"/>
+                <a:spcPct val="130000"/>
               </a:lnSpc>
               <a:buFont typeface="Courier New" panose="02070309020205020404" pitchFamily="49" charset="0"/>
               <a:buChar char="o"/>
@@ -6354,7 +7036,7 @@
           <a:p>
             <a:pPr marL="285750" indent="-285750">
               <a:lnSpc>
-                <a:spcPct val="150000"/>
+                <a:spcPct val="130000"/>
               </a:lnSpc>
               <a:buFont typeface="Courier New" panose="02070309020205020404" pitchFamily="49" charset="0"/>
               <a:buChar char="o"/>
@@ -6367,18 +7049,18 @@
           <a:p>
             <a:pPr>
               <a:lnSpc>
-                <a:spcPct val="150000"/>
+                <a:spcPct val="130000"/>
               </a:lnSpc>
             </a:pPr>
             <a:r>
               <a:rPr lang="de-DE" dirty="0"/>
-              <a:t>Instrumente:</a:t>
+              <a:t>Bandpositionen:</a:t>
             </a:r>
           </a:p>
           <a:p>
             <a:pPr marL="285750" indent="-285750">
               <a:lnSpc>
-                <a:spcPct val="150000"/>
+                <a:spcPct val="130000"/>
               </a:lnSpc>
               <a:buFont typeface="Wingdings" panose="05000000000000000000" pitchFamily="2" charset="2"/>
               <a:buChar char="§"/>
@@ -6391,7 +7073,7 @@
           <a:p>
             <a:pPr marL="285750" indent="-285750">
               <a:lnSpc>
-                <a:spcPct val="150000"/>
+                <a:spcPct val="130000"/>
               </a:lnSpc>
               <a:buFont typeface="Wingdings" panose="05000000000000000000" pitchFamily="2" charset="2"/>
               <a:buChar char="§"/>
@@ -6625,7 +7307,7 @@
         </p:nvSpPr>
         <p:spPr>
           <a:xfrm>
-            <a:off x="3268717" y="1960005"/>
+            <a:off x="3268716" y="1911620"/>
             <a:ext cx="1776249" cy="231227"/>
           </a:xfrm>
           <a:prstGeom prst="rect">
@@ -6677,7 +7359,7 @@
         </p:nvSpPr>
         <p:spPr>
           <a:xfrm>
-            <a:off x="3284485" y="2385672"/>
+            <a:off x="3284484" y="2271933"/>
             <a:ext cx="1776249" cy="231227"/>
           </a:xfrm>
           <a:prstGeom prst="rect">
@@ -6729,7 +7411,7 @@
         </p:nvSpPr>
         <p:spPr>
           <a:xfrm>
-            <a:off x="3284484" y="2802380"/>
+            <a:off x="3284484" y="2623478"/>
             <a:ext cx="1776249" cy="231227"/>
           </a:xfrm>
           <a:prstGeom prst="rect">
@@ -6781,7 +7463,7 @@
         </p:nvSpPr>
         <p:spPr>
           <a:xfrm>
-            <a:off x="3268716" y="3217030"/>
+            <a:off x="3268716" y="2938734"/>
             <a:ext cx="1776249" cy="231227"/>
           </a:xfrm>
           <a:prstGeom prst="rect">
@@ -6880,7 +7562,7 @@
         </p:nvSpPr>
         <p:spPr>
           <a:xfrm>
-            <a:off x="3171497" y="5306689"/>
+            <a:off x="3171497" y="4789856"/>
             <a:ext cx="3376447" cy="231232"/>
           </a:xfrm>
           <a:prstGeom prst="rect">
@@ -6915,7 +7597,7 @@
                   <a:schemeClr val="tx1"/>
                 </a:solidFill>
               </a:rPr>
-              <a:t>Dropdown: ohne/besetzt/offen</a:t>
+              <a:t>Dropdown: besetzt/offen</a:t>
             </a:r>
           </a:p>
         </p:txBody>
@@ -6934,7 +7616,7 @@
         </p:nvSpPr>
         <p:spPr>
           <a:xfrm>
-            <a:off x="3187263" y="5715387"/>
+            <a:off x="3187263" y="5128975"/>
             <a:ext cx="3376446" cy="248195"/>
           </a:xfrm>
           <a:prstGeom prst="rect">
@@ -6969,7 +7651,210 @@
                   <a:schemeClr val="tx1"/>
                 </a:solidFill>
               </a:rPr>
-              <a:t>Dropdown ohne/besetzt/offen</a:t>
+              <a:t>Dropdown: besetzt/offen</a:t>
+            </a:r>
+          </a:p>
+        </p:txBody>
+      </p:sp>
+      <p:sp>
+        <p:nvSpPr>
+          <p:cNvPr id="16" name="Rechteck 15">
+            <a:extLst>
+              <a:ext uri="{FF2B5EF4-FFF2-40B4-BE49-F238E27FC236}">
+                <a16:creationId xmlns:a16="http://schemas.microsoft.com/office/drawing/2014/main" id="{A68AC361-0F70-4372-A928-8F7352AA44B1}"/>
+              </a:ext>
+            </a:extLst>
+          </p:cNvPr>
+          <p:cNvSpPr/>
+          <p:nvPr/>
+        </p:nvSpPr>
+        <p:spPr>
+          <a:xfrm>
+            <a:off x="6792653" y="4789856"/>
+            <a:ext cx="1360747" cy="233740"/>
+          </a:xfrm>
+          <a:prstGeom prst="rect">
+            <a:avLst/>
+          </a:prstGeom>
+          <a:noFill/>
+        </p:spPr>
+        <p:style>
+          <a:lnRef idx="2">
+            <a:schemeClr val="accent1">
+              <a:shade val="50000"/>
+            </a:schemeClr>
+          </a:lnRef>
+          <a:fillRef idx="1">
+            <a:schemeClr val="accent1"/>
+          </a:fillRef>
+          <a:effectRef idx="0">
+            <a:schemeClr val="accent1"/>
+          </a:effectRef>
+          <a:fontRef idx="minor">
+            <a:schemeClr val="lt1"/>
+          </a:fontRef>
+        </p:style>
+        <p:txBody>
+          <a:bodyPr rtlCol="0" anchor="ctr"/>
+          <a:lstStyle/>
+          <a:p>
+            <a:pPr algn="ctr"/>
+            <a:r>
+              <a:rPr lang="de-DE" dirty="0">
+                <a:solidFill>
+                  <a:schemeClr val="tx1"/>
+                </a:solidFill>
+              </a:rPr>
+              <a:t>Löschen</a:t>
+            </a:r>
+          </a:p>
+        </p:txBody>
+      </p:sp>
+      <p:sp>
+        <p:nvSpPr>
+          <p:cNvPr id="17" name="Rechteck 16">
+            <a:extLst>
+              <a:ext uri="{FF2B5EF4-FFF2-40B4-BE49-F238E27FC236}">
+                <a16:creationId xmlns:a16="http://schemas.microsoft.com/office/drawing/2014/main" id="{049E1011-82C7-462D-8442-1FC6FBB031CC}"/>
+              </a:ext>
+            </a:extLst>
+          </p:cNvPr>
+          <p:cNvSpPr/>
+          <p:nvPr/>
+        </p:nvSpPr>
+        <p:spPr>
+          <a:xfrm>
+            <a:off x="6792653" y="5143430"/>
+            <a:ext cx="1360747" cy="233740"/>
+          </a:xfrm>
+          <a:prstGeom prst="rect">
+            <a:avLst/>
+          </a:prstGeom>
+          <a:noFill/>
+        </p:spPr>
+        <p:style>
+          <a:lnRef idx="2">
+            <a:schemeClr val="accent1">
+              <a:shade val="50000"/>
+            </a:schemeClr>
+          </a:lnRef>
+          <a:fillRef idx="1">
+            <a:schemeClr val="accent1"/>
+          </a:fillRef>
+          <a:effectRef idx="0">
+            <a:schemeClr val="accent1"/>
+          </a:effectRef>
+          <a:fontRef idx="minor">
+            <a:schemeClr val="lt1"/>
+          </a:fontRef>
+        </p:style>
+        <p:txBody>
+          <a:bodyPr rtlCol="0" anchor="ctr"/>
+          <a:lstStyle/>
+          <a:p>
+            <a:pPr algn="ctr"/>
+            <a:r>
+              <a:rPr lang="de-DE" dirty="0">
+                <a:solidFill>
+                  <a:schemeClr val="tx1"/>
+                </a:solidFill>
+              </a:rPr>
+              <a:t>Löschen</a:t>
+            </a:r>
+          </a:p>
+        </p:txBody>
+      </p:sp>
+      <p:sp>
+        <p:nvSpPr>
+          <p:cNvPr id="18" name="Textfeld 17">
+            <a:extLst>
+              <a:ext uri="{FF2B5EF4-FFF2-40B4-BE49-F238E27FC236}">
+                <a16:creationId xmlns:a16="http://schemas.microsoft.com/office/drawing/2014/main" id="{798B8082-B127-429A-B237-092E8A9C5468}"/>
+              </a:ext>
+            </a:extLst>
+          </p:cNvPr>
+          <p:cNvSpPr txBox="1"/>
+          <p:nvPr/>
+        </p:nvSpPr>
+        <p:spPr>
+          <a:xfrm>
+            <a:off x="3123745" y="5553490"/>
+            <a:ext cx="2309990" cy="369332"/>
+          </a:xfrm>
+          <a:prstGeom prst="rect">
+            <a:avLst/>
+          </a:prstGeom>
+          <a:noFill/>
+        </p:spPr>
+        <p:txBody>
+          <a:bodyPr wrap="square" rtlCol="0">
+            <a:spAutoFit/>
+          </a:bodyPr>
+          <a:lstStyle/>
+          <a:p>
+            <a:r>
+              <a:rPr lang="de-DE" u="sng" dirty="0">
+                <a:solidFill>
+                  <a:schemeClr val="accent1">
+                    <a:lumMod val="75000"/>
+                  </a:schemeClr>
+                </a:solidFill>
+              </a:rPr>
+              <a:t>Position hinzufügen</a:t>
+            </a:r>
+          </a:p>
+        </p:txBody>
+      </p:sp>
+      <p:sp>
+        <p:nvSpPr>
+          <p:cNvPr id="19" name="Rechteck 18">
+            <a:extLst>
+              <a:ext uri="{FF2B5EF4-FFF2-40B4-BE49-F238E27FC236}">
+                <a16:creationId xmlns:a16="http://schemas.microsoft.com/office/drawing/2014/main" id="{6182D2F3-4EEA-4C76-9153-4398173A849F}"/>
+              </a:ext>
+            </a:extLst>
+          </p:cNvPr>
+          <p:cNvSpPr/>
+          <p:nvPr/>
+        </p:nvSpPr>
+        <p:spPr>
+          <a:xfrm>
+            <a:off x="1073426" y="5650699"/>
+            <a:ext cx="2050319" cy="213978"/>
+          </a:xfrm>
+          <a:prstGeom prst="rect">
+            <a:avLst/>
+          </a:prstGeom>
+          <a:noFill/>
+        </p:spPr>
+        <p:style>
+          <a:lnRef idx="2">
+            <a:schemeClr val="accent1">
+              <a:shade val="50000"/>
+            </a:schemeClr>
+          </a:lnRef>
+          <a:fillRef idx="1">
+            <a:schemeClr val="accent1"/>
+          </a:fillRef>
+          <a:effectRef idx="0">
+            <a:schemeClr val="accent1"/>
+          </a:effectRef>
+          <a:fontRef idx="minor">
+            <a:schemeClr val="lt1"/>
+          </a:fontRef>
+        </p:style>
+        <p:txBody>
+          <a:bodyPr rtlCol="0" anchor="ctr"/>
+          <a:lstStyle/>
+          <a:p>
+            <a:pPr algn="ctr"/>
+            <a:r>
+              <a:rPr lang="de-DE" sz="1400" dirty="0">
+                <a:solidFill>
+                  <a:schemeClr val="tx1"/>
+                </a:solidFill>
+              </a:rPr>
+              <a:t>Dropdown: Instrumente</a:t>
             </a:r>
           </a:p>
         </p:txBody>
@@ -7006,416 +7891,6 @@
       </p:grpSpPr>
       <p:sp>
         <p:nvSpPr>
-          <p:cNvPr id="6" name="Textfeld 5">
-            <a:extLst>
-              <a:ext uri="{FF2B5EF4-FFF2-40B4-BE49-F238E27FC236}">
-                <a16:creationId xmlns:a16="http://schemas.microsoft.com/office/drawing/2014/main" id="{E8F2A78A-3BB3-47BC-B3F0-4CD9299A609E}"/>
-              </a:ext>
-            </a:extLst>
-          </p:cNvPr>
-          <p:cNvSpPr txBox="1"/>
-          <p:nvPr/>
-        </p:nvSpPr>
-        <p:spPr>
-          <a:xfrm>
-            <a:off x="1073426" y="1421296"/>
-            <a:ext cx="10280374" cy="3970318"/>
-          </a:xfrm>
-          <a:prstGeom prst="rect">
-            <a:avLst/>
-          </a:prstGeom>
-          <a:noFill/>
-        </p:spPr>
-        <p:txBody>
-          <a:bodyPr wrap="square" rtlCol="0">
-            <a:spAutoFit/>
-          </a:bodyPr>
-          <a:lstStyle/>
-          <a:p>
-            <a:r>
-              <a:rPr lang="de-DE" dirty="0"/>
-              <a:t>Willkommen Stefan!</a:t>
-            </a:r>
-          </a:p>
-          <a:p>
-            <a:endParaRPr lang="de-DE" dirty="0"/>
-          </a:p>
-          <a:p>
-            <a:r>
-              <a:rPr lang="de-DE" dirty="0" err="1"/>
-              <a:t>Lorem</a:t>
-            </a:r>
-            <a:r>
-              <a:rPr lang="de-DE" dirty="0"/>
-              <a:t> </a:t>
-            </a:r>
-            <a:r>
-              <a:rPr lang="de-DE" dirty="0" err="1"/>
-              <a:t>ipsum</a:t>
-            </a:r>
-            <a:r>
-              <a:rPr lang="de-DE" dirty="0"/>
-              <a:t> </a:t>
-            </a:r>
-            <a:r>
-              <a:rPr lang="de-DE" dirty="0" err="1"/>
-              <a:t>dolor</a:t>
-            </a:r>
-            <a:r>
-              <a:rPr lang="de-DE" dirty="0"/>
-              <a:t> </a:t>
-            </a:r>
-            <a:r>
-              <a:rPr lang="de-DE" dirty="0" err="1"/>
-              <a:t>sit</a:t>
-            </a:r>
-            <a:r>
-              <a:rPr lang="de-DE" dirty="0"/>
-              <a:t> </a:t>
-            </a:r>
-            <a:r>
-              <a:rPr lang="de-DE" dirty="0" err="1"/>
-              <a:t>amet</a:t>
-            </a:r>
-            <a:r>
-              <a:rPr lang="de-DE" dirty="0"/>
-              <a:t>, </a:t>
-            </a:r>
-            <a:r>
-              <a:rPr lang="de-DE" dirty="0" err="1"/>
-              <a:t>consetetur</a:t>
-            </a:r>
-            <a:r>
-              <a:rPr lang="de-DE" dirty="0"/>
-              <a:t> </a:t>
-            </a:r>
-            <a:r>
-              <a:rPr lang="de-DE" dirty="0" err="1"/>
-              <a:t>sadipscing</a:t>
-            </a:r>
-            <a:r>
-              <a:rPr lang="de-DE" dirty="0"/>
-              <a:t> </a:t>
-            </a:r>
-            <a:r>
-              <a:rPr lang="de-DE" dirty="0" err="1"/>
-              <a:t>elitr</a:t>
-            </a:r>
-            <a:r>
-              <a:rPr lang="de-DE" dirty="0"/>
-              <a:t>, sed </a:t>
-            </a:r>
-            <a:r>
-              <a:rPr lang="de-DE" dirty="0" err="1"/>
-              <a:t>diam</a:t>
-            </a:r>
-            <a:r>
-              <a:rPr lang="de-DE" dirty="0"/>
-              <a:t> </a:t>
-            </a:r>
-            <a:r>
-              <a:rPr lang="de-DE" dirty="0" err="1"/>
-              <a:t>nonumy</a:t>
-            </a:r>
-            <a:r>
-              <a:rPr lang="de-DE" dirty="0"/>
-              <a:t> </a:t>
-            </a:r>
-            <a:r>
-              <a:rPr lang="de-DE" dirty="0" err="1"/>
-              <a:t>eirmod</a:t>
-            </a:r>
-            <a:r>
-              <a:rPr lang="de-DE" dirty="0"/>
-              <a:t> </a:t>
-            </a:r>
-            <a:r>
-              <a:rPr lang="de-DE" dirty="0" err="1"/>
-              <a:t>tempor</a:t>
-            </a:r>
-            <a:r>
-              <a:rPr lang="de-DE" dirty="0"/>
-              <a:t> </a:t>
-            </a:r>
-            <a:r>
-              <a:rPr lang="de-DE" dirty="0" err="1"/>
-              <a:t>invidunt</a:t>
-            </a:r>
-            <a:r>
-              <a:rPr lang="de-DE" dirty="0"/>
-              <a:t> </a:t>
-            </a:r>
-            <a:r>
-              <a:rPr lang="de-DE" dirty="0" err="1"/>
-              <a:t>ut</a:t>
-            </a:r>
-            <a:r>
-              <a:rPr lang="de-DE" dirty="0"/>
-              <a:t> </a:t>
-            </a:r>
-            <a:r>
-              <a:rPr lang="de-DE" dirty="0" err="1"/>
-              <a:t>labore</a:t>
-            </a:r>
-            <a:r>
-              <a:rPr lang="de-DE" dirty="0"/>
-              <a:t> et </a:t>
-            </a:r>
-            <a:r>
-              <a:rPr lang="de-DE" dirty="0" err="1"/>
-              <a:t>dolore</a:t>
-            </a:r>
-            <a:r>
-              <a:rPr lang="de-DE" dirty="0"/>
-              <a:t> magna </a:t>
-            </a:r>
-            <a:r>
-              <a:rPr lang="de-DE" dirty="0" err="1"/>
-              <a:t>aliquyam</a:t>
-            </a:r>
-            <a:r>
-              <a:rPr lang="de-DE" dirty="0"/>
-              <a:t> </a:t>
-            </a:r>
-            <a:r>
-              <a:rPr lang="de-DE" dirty="0" err="1"/>
-              <a:t>erat</a:t>
-            </a:r>
-            <a:r>
-              <a:rPr lang="de-DE" dirty="0"/>
-              <a:t>, sed </a:t>
-            </a:r>
-            <a:r>
-              <a:rPr lang="de-DE" dirty="0" err="1"/>
-              <a:t>diam</a:t>
-            </a:r>
-            <a:r>
-              <a:rPr lang="de-DE" dirty="0"/>
-              <a:t> </a:t>
-            </a:r>
-            <a:r>
-              <a:rPr lang="de-DE" dirty="0" err="1"/>
-              <a:t>voluptua</a:t>
-            </a:r>
-            <a:r>
-              <a:rPr lang="de-DE" dirty="0"/>
-              <a:t>. At </a:t>
-            </a:r>
-            <a:r>
-              <a:rPr lang="de-DE" dirty="0" err="1"/>
-              <a:t>vero</a:t>
-            </a:r>
-            <a:r>
-              <a:rPr lang="de-DE" dirty="0"/>
-              <a:t> </a:t>
-            </a:r>
-            <a:r>
-              <a:rPr lang="de-DE" dirty="0" err="1"/>
-              <a:t>eos</a:t>
-            </a:r>
-            <a:r>
-              <a:rPr lang="de-DE" dirty="0"/>
-              <a:t> et </a:t>
-            </a:r>
-            <a:r>
-              <a:rPr lang="de-DE" dirty="0" err="1"/>
-              <a:t>accusam</a:t>
-            </a:r>
-            <a:r>
-              <a:rPr lang="de-DE" dirty="0"/>
-              <a:t> et </a:t>
-            </a:r>
-            <a:r>
-              <a:rPr lang="de-DE" dirty="0" err="1"/>
-              <a:t>justo</a:t>
-            </a:r>
-            <a:r>
-              <a:rPr lang="de-DE" dirty="0"/>
-              <a:t> </a:t>
-            </a:r>
-            <a:r>
-              <a:rPr lang="de-DE" dirty="0" err="1"/>
-              <a:t>duo</a:t>
-            </a:r>
-            <a:r>
-              <a:rPr lang="de-DE" dirty="0"/>
-              <a:t> </a:t>
-            </a:r>
-            <a:r>
-              <a:rPr lang="de-DE" dirty="0" err="1"/>
-              <a:t>dolores</a:t>
-            </a:r>
-            <a:r>
-              <a:rPr lang="de-DE" dirty="0"/>
-              <a:t> et </a:t>
-            </a:r>
-            <a:r>
-              <a:rPr lang="de-DE" dirty="0" err="1"/>
-              <a:t>ea</a:t>
-            </a:r>
-            <a:r>
-              <a:rPr lang="de-DE" dirty="0"/>
-              <a:t> </a:t>
-            </a:r>
-            <a:r>
-              <a:rPr lang="de-DE" dirty="0" err="1"/>
-              <a:t>rebum</a:t>
-            </a:r>
-            <a:r>
-              <a:rPr lang="de-DE" dirty="0"/>
-              <a:t>. </a:t>
-            </a:r>
-          </a:p>
-          <a:p>
-            <a:endParaRPr lang="de-DE" dirty="0"/>
-          </a:p>
-          <a:p>
-            <a:r>
-              <a:rPr lang="de-DE" dirty="0"/>
-              <a:t>Geschlecht: 	Mann</a:t>
-            </a:r>
-          </a:p>
-          <a:p>
-            <a:r>
-              <a:rPr lang="de-DE" dirty="0"/>
-              <a:t>Nachname:	Mustermann</a:t>
-            </a:r>
-          </a:p>
-          <a:p>
-            <a:r>
-              <a:rPr lang="de-DE" dirty="0"/>
-              <a:t>Geburtsdatum:	01.01.2000</a:t>
-            </a:r>
-          </a:p>
-          <a:p>
-            <a:r>
-              <a:rPr lang="de-DE" dirty="0"/>
-              <a:t>Standort: 	53227 Bonn</a:t>
-            </a:r>
-          </a:p>
-          <a:p>
-            <a:r>
-              <a:rPr lang="de-DE" dirty="0"/>
-              <a:t>Email:		</a:t>
-            </a:r>
-            <a:r>
-              <a:rPr lang="de-DE" dirty="0">
-                <a:hlinkClick r:id="rId2"/>
-              </a:rPr>
-              <a:t>email@acdc.com</a:t>
-            </a:r>
-            <a:endParaRPr lang="de-DE" dirty="0"/>
-          </a:p>
-          <a:p>
-            <a:r>
-              <a:rPr lang="de-DE" dirty="0"/>
-              <a:t>Telefon:		+49 171 …</a:t>
-            </a:r>
-          </a:p>
-          <a:p>
-            <a:r>
-              <a:rPr lang="de-DE" dirty="0"/>
-              <a:t>Lieblings-Genre:	Schlager, Pop</a:t>
-            </a:r>
-          </a:p>
-          <a:p>
-            <a:r>
-              <a:rPr lang="de-DE" dirty="0"/>
-              <a:t>Instrumente:	Gitarre, Schlagzeug</a:t>
-            </a:r>
-          </a:p>
-          <a:p>
-            <a:r>
-              <a:rPr lang="de-DE" dirty="0"/>
-              <a:t>Benutzername:	</a:t>
-            </a:r>
-            <a:r>
-              <a:rPr lang="de-DE" dirty="0" err="1"/>
-              <a:t>stefanm</a:t>
-            </a:r>
-            <a:endParaRPr lang="de-DE" dirty="0"/>
-          </a:p>
-        </p:txBody>
-      </p:sp>
-      <p:sp>
-        <p:nvSpPr>
-          <p:cNvPr id="10" name="Titel 3">
-            <a:extLst>
-              <a:ext uri="{FF2B5EF4-FFF2-40B4-BE49-F238E27FC236}">
-                <a16:creationId xmlns:a16="http://schemas.microsoft.com/office/drawing/2014/main" id="{CD42BD10-E45A-4122-AE6B-A3A03B39331B}"/>
-              </a:ext>
-            </a:extLst>
-          </p:cNvPr>
-          <p:cNvSpPr txBox="1">
-            <a:spLocks/>
-          </p:cNvSpPr>
-          <p:nvPr/>
-        </p:nvSpPr>
-        <p:spPr>
-          <a:xfrm>
-            <a:off x="838200" y="365126"/>
-            <a:ext cx="10515600" cy="837510"/>
-          </a:xfrm>
-          <a:prstGeom prst="rect">
-            <a:avLst/>
-          </a:prstGeom>
-          <a:ln>
-            <a:solidFill>
-              <a:schemeClr val="tx1"/>
-            </a:solidFill>
-          </a:ln>
-        </p:spPr>
-        <p:txBody>
-          <a:bodyPr vert="horz" lIns="91440" tIns="45720" rIns="91440" bIns="45720" rtlCol="0" anchor="ctr">
-            <a:normAutofit/>
-          </a:bodyPr>
-          <a:lstStyle>
-            <a:lvl1pPr algn="l" defTabSz="914400" rtl="0" eaLnBrk="1" latinLnBrk="0" hangingPunct="1">
-              <a:lnSpc>
-                <a:spcPct val="90000"/>
-              </a:lnSpc>
-              <a:spcBef>
-                <a:spcPct val="0"/>
-              </a:spcBef>
-              <a:buNone/>
-              <a:defRPr sz="4400" kern="1200">
-                <a:solidFill>
-                  <a:schemeClr val="tx1"/>
-                </a:solidFill>
-                <a:latin typeface="+mj-lt"/>
-                <a:ea typeface="+mj-ea"/>
-                <a:cs typeface="+mj-cs"/>
-              </a:defRPr>
-            </a:lvl1pPr>
-          </a:lstStyle>
-          <a:p>
-            <a:pPr>
-              <a:tabLst>
-                <a:tab pos="2238375" algn="l"/>
-                <a:tab pos="4130675" algn="l"/>
-                <a:tab pos="7893050" algn="l"/>
-                <a:tab pos="10310813" algn="l"/>
-              </a:tabLst>
-            </a:pPr>
-            <a:r>
-              <a:rPr lang="de-DE" sz="2800" dirty="0"/>
-              <a:t>Home	Bands		</a:t>
-            </a:r>
-            <a:r>
-              <a:rPr lang="de-DE" sz="2800" dirty="0">
-                <a:solidFill>
-                  <a:schemeClr val="bg1">
-                    <a:lumMod val="50000"/>
-                  </a:schemeClr>
-                </a:solidFill>
-              </a:rPr>
-              <a:t>Benutzerprofil</a:t>
-            </a:r>
-          </a:p>
-        </p:txBody>
-      </p:sp>
-      <p:sp>
-        <p:nvSpPr>
           <p:cNvPr id="3" name="Fußzeilenplatzhalter 2">
             <a:extLst>
               <a:ext uri="{FF2B5EF4-FFF2-40B4-BE49-F238E27FC236}">
@@ -7437,125 +7912,333 @@
           <a:p>
             <a:r>
               <a:rPr lang="de-DE" dirty="0"/>
-              <a:t>Benutzerprofil anzeigen</a:t>
-            </a:r>
-          </a:p>
-        </p:txBody>
-      </p:sp>
-      <p:sp>
-        <p:nvSpPr>
-          <p:cNvPr id="8" name="Rechteck: abgerundete Ecken 7">
-            <a:extLst>
-              <a:ext uri="{FF2B5EF4-FFF2-40B4-BE49-F238E27FC236}">
-                <a16:creationId xmlns:a16="http://schemas.microsoft.com/office/drawing/2014/main" id="{56682BFF-6128-4135-B049-005BAB044BF2}"/>
-              </a:ext>
-            </a:extLst>
-          </p:cNvPr>
-          <p:cNvSpPr/>
+              <a:t>Benutzer registrieren</a:t>
+            </a:r>
+          </a:p>
+        </p:txBody>
+      </p:sp>
+      <p:pic>
+        <p:nvPicPr>
+          <p:cNvPr id="7" name="Grafik 6">
+            <a:extLst>
+              <a:ext uri="{FF2B5EF4-FFF2-40B4-BE49-F238E27FC236}">
+                <a16:creationId xmlns:a16="http://schemas.microsoft.com/office/drawing/2014/main" id="{B750FD2D-52C2-4234-8A1B-A4029F90C75A}"/>
+              </a:ext>
+            </a:extLst>
+          </p:cNvPr>
+          <p:cNvPicPr>
+            <a:picLocks noChangeAspect="1"/>
+          </p:cNvPicPr>
           <p:nvPr/>
-        </p:nvSpPr>
+        </p:nvPicPr>
+        <p:blipFill>
+          <a:blip r:embed="rId2">
+            <a:extLst>
+              <a:ext uri="{28A0092B-C50C-407E-A947-70E740481C1C}">
+                <a14:useLocalDpi xmlns:a14="http://schemas.microsoft.com/office/drawing/2010/main" val="0"/>
+              </a:ext>
+            </a:extLst>
+          </a:blip>
+          <a:stretch>
+            <a:fillRect/>
+          </a:stretch>
+        </p:blipFill>
         <p:spPr>
           <a:xfrm>
-            <a:off x="9246704" y="6163875"/>
-            <a:ext cx="2107096" cy="437322"/>
-          </a:xfrm>
-          <a:prstGeom prst="roundRect">
-            <a:avLst/>
-          </a:prstGeom>
-        </p:spPr>
-        <p:style>
-          <a:lnRef idx="2">
-            <a:schemeClr val="accent6"/>
-          </a:lnRef>
-          <a:fillRef idx="1">
-            <a:schemeClr val="lt1"/>
-          </a:fillRef>
-          <a:effectRef idx="0">
-            <a:schemeClr val="accent6"/>
-          </a:effectRef>
-          <a:fontRef idx="minor">
-            <a:schemeClr val="dk1"/>
-          </a:fontRef>
-        </p:style>
-        <p:txBody>
-          <a:bodyPr rtlCol="0" anchor="ctr"/>
-          <a:lstStyle/>
-          <a:p>
-            <a:pPr algn="ctr"/>
-            <a:r>
-              <a:rPr lang="de-DE" dirty="0"/>
-              <a:t>Edit</a:t>
-            </a:r>
-          </a:p>
-        </p:txBody>
-      </p:sp>
-      <p:sp>
-        <p:nvSpPr>
-          <p:cNvPr id="2" name="Textfeld 1">
-            <a:extLst>
-              <a:ext uri="{FF2B5EF4-FFF2-40B4-BE49-F238E27FC236}">
-                <a16:creationId xmlns:a16="http://schemas.microsoft.com/office/drawing/2014/main" id="{9885A64D-C879-42D2-B5FB-439928EDC748}"/>
-              </a:ext>
-            </a:extLst>
-          </p:cNvPr>
-          <p:cNvSpPr txBox="1"/>
-          <p:nvPr/>
-        </p:nvSpPr>
-        <p:spPr>
-          <a:xfrm>
-            <a:off x="1073426" y="5391614"/>
-            <a:ext cx="3657600" cy="923330"/>
+            <a:off x="2834309" y="350147"/>
+            <a:ext cx="6781800" cy="5819775"/>
           </a:xfrm>
           <a:prstGeom prst="rect">
             <a:avLst/>
           </a:prstGeom>
-          <a:noFill/>
-        </p:spPr>
-        <p:txBody>
-          <a:bodyPr wrap="square" rtlCol="0">
-            <a:spAutoFit/>
-          </a:bodyPr>
-          <a:lstStyle/>
-          <a:p>
-            <a:r>
-              <a:rPr lang="de-DE" dirty="0"/>
-              <a:t>Meine Bands:</a:t>
-            </a:r>
-          </a:p>
-          <a:p>
-            <a:pPr marL="285750" indent="-285750">
-              <a:buFont typeface="Arial" panose="020B0604020202020204" pitchFamily="34" charset="0"/>
-              <a:buChar char="•"/>
-            </a:pPr>
-            <a:r>
-              <a:rPr lang="de-DE" u="sng" dirty="0">
-                <a:solidFill>
-                  <a:schemeClr val="accent1">
-                    <a:lumMod val="50000"/>
-                  </a:schemeClr>
-                </a:solidFill>
-              </a:rPr>
-              <a:t>ACDC</a:t>
-            </a:r>
-          </a:p>
-          <a:p>
-            <a:r>
-              <a:rPr lang="de-DE" u="sng" dirty="0">
-                <a:solidFill>
-                  <a:schemeClr val="accent1">
-                    <a:lumMod val="50000"/>
-                  </a:schemeClr>
-                </a:solidFill>
-              </a:rPr>
-              <a:t>Neue Band anlegen</a:t>
-            </a:r>
-          </a:p>
-        </p:txBody>
-      </p:sp>
+        </p:spPr>
+      </p:pic>
     </p:spTree>
     <p:extLst>
       <p:ext uri="{BB962C8B-B14F-4D97-AF65-F5344CB8AC3E}">
-        <p14:creationId xmlns:p14="http://schemas.microsoft.com/office/powerpoint/2010/main" val="2944483094"/>
+        <p14:creationId xmlns:p14="http://schemas.microsoft.com/office/powerpoint/2010/main" val="3220735423"/>
+      </p:ext>
+    </p:extLst>
+  </p:cSld>
+  <p:clrMapOvr>
+    <a:masterClrMapping/>
+  </p:clrMapOvr>
+</p:sld>
+</file>
+
+<file path=ppt/slides/slide7.xml><?xml version="1.0" encoding="utf-8"?>
+<p:sld xmlns:a="http://schemas.openxmlformats.org/drawingml/2006/main" xmlns:r="http://schemas.openxmlformats.org/officeDocument/2006/relationships" xmlns:p="http://schemas.openxmlformats.org/presentationml/2006/main">
+  <p:cSld>
+    <p:spTree>
+      <p:nvGrpSpPr>
+        <p:cNvPr id="1" name=""/>
+        <p:cNvGrpSpPr/>
+        <p:nvPr/>
+      </p:nvGrpSpPr>
+      <p:grpSpPr>
+        <a:xfrm>
+          <a:off x="0" y="0"/>
+          <a:ext cx="0" cy="0"/>
+          <a:chOff x="0" y="0"/>
+          <a:chExt cx="0" cy="0"/>
+        </a:xfrm>
+      </p:grpSpPr>
+      <p:pic>
+        <p:nvPicPr>
+          <p:cNvPr id="3" name="Grafik 2">
+            <a:extLst>
+              <a:ext uri="{FF2B5EF4-FFF2-40B4-BE49-F238E27FC236}">
+                <a16:creationId xmlns:a16="http://schemas.microsoft.com/office/drawing/2014/main" id="{93886327-A417-4431-9BD6-5901C89BC3C8}"/>
+              </a:ext>
+            </a:extLst>
+          </p:cNvPr>
+          <p:cNvPicPr>
+            <a:picLocks noChangeAspect="1"/>
+          </p:cNvPicPr>
+          <p:nvPr/>
+        </p:nvPicPr>
+        <p:blipFill>
+          <a:blip r:embed="rId2">
+            <a:extLst>
+              <a:ext uri="{28A0092B-C50C-407E-A947-70E740481C1C}">
+                <a14:useLocalDpi xmlns:a14="http://schemas.microsoft.com/office/drawing/2010/main" val="0"/>
+              </a:ext>
+            </a:extLst>
+          </a:blip>
+          <a:stretch>
+            <a:fillRect/>
+          </a:stretch>
+        </p:blipFill>
+        <p:spPr>
+          <a:xfrm>
+            <a:off x="4492337" y="680830"/>
+            <a:ext cx="2968771" cy="5496339"/>
+          </a:xfrm>
+          <a:prstGeom prst="rect">
+            <a:avLst/>
+          </a:prstGeom>
+        </p:spPr>
+      </p:pic>
+      <p:sp>
+        <p:nvSpPr>
+          <p:cNvPr id="4" name="Fußzeilenplatzhalter 3">
+            <a:extLst>
+              <a:ext uri="{FF2B5EF4-FFF2-40B4-BE49-F238E27FC236}">
+                <a16:creationId xmlns:a16="http://schemas.microsoft.com/office/drawing/2014/main" id="{55AF2049-A529-45CA-B5BB-1C5879A99F70}"/>
+              </a:ext>
+            </a:extLst>
+          </p:cNvPr>
+          <p:cNvSpPr>
+            <a:spLocks noGrp="1"/>
+          </p:cNvSpPr>
+          <p:nvPr>
+            <p:ph type="ftr" sz="quarter" idx="11"/>
+          </p:nvPr>
+        </p:nvSpPr>
+        <p:spPr/>
+        <p:txBody>
+          <a:bodyPr/>
+          <a:lstStyle/>
+          <a:p>
+            <a:r>
+              <a:rPr lang="de-DE"/>
+              <a:t>Benutzer anmelden</a:t>
+            </a:r>
+          </a:p>
+        </p:txBody>
+      </p:sp>
+    </p:spTree>
+    <p:extLst>
+      <p:ext uri="{BB962C8B-B14F-4D97-AF65-F5344CB8AC3E}">
+        <p14:creationId xmlns:p14="http://schemas.microsoft.com/office/powerpoint/2010/main" val="3053912514"/>
+      </p:ext>
+    </p:extLst>
+  </p:cSld>
+  <p:clrMapOvr>
+    <a:masterClrMapping/>
+  </p:clrMapOvr>
+</p:sld>
+</file>
+
+<file path=ppt/slides/slide8.xml><?xml version="1.0" encoding="utf-8"?>
+<p:sld xmlns:a="http://schemas.openxmlformats.org/drawingml/2006/main" xmlns:r="http://schemas.openxmlformats.org/officeDocument/2006/relationships" xmlns:p="http://schemas.openxmlformats.org/presentationml/2006/main">
+  <p:cSld>
+    <p:spTree>
+      <p:nvGrpSpPr>
+        <p:cNvPr id="1" name=""/>
+        <p:cNvGrpSpPr/>
+        <p:nvPr/>
+      </p:nvGrpSpPr>
+      <p:grpSpPr>
+        <a:xfrm>
+          <a:off x="0" y="0"/>
+          <a:ext cx="0" cy="0"/>
+          <a:chOff x="0" y="0"/>
+          <a:chExt cx="0" cy="0"/>
+        </a:xfrm>
+      </p:grpSpPr>
+      <p:sp>
+        <p:nvSpPr>
+          <p:cNvPr id="2" name="Fußzeilenplatzhalter 1">
+            <a:extLst>
+              <a:ext uri="{FF2B5EF4-FFF2-40B4-BE49-F238E27FC236}">
+                <a16:creationId xmlns:a16="http://schemas.microsoft.com/office/drawing/2014/main" id="{699FA65A-A38D-4563-BC14-4DFF4B140E9E}"/>
+              </a:ext>
+            </a:extLst>
+          </p:cNvPr>
+          <p:cNvSpPr>
+            <a:spLocks noGrp="1"/>
+          </p:cNvSpPr>
+          <p:nvPr>
+            <p:ph type="ftr" sz="quarter" idx="11"/>
+          </p:nvPr>
+        </p:nvSpPr>
+        <p:spPr/>
+        <p:txBody>
+          <a:bodyPr/>
+          <a:lstStyle/>
+          <a:p>
+            <a:r>
+              <a:rPr lang="de-DE"/>
+              <a:t>Benutzerprofil anzeigen</a:t>
+            </a:r>
+          </a:p>
+        </p:txBody>
+      </p:sp>
+      <p:pic>
+        <p:nvPicPr>
+          <p:cNvPr id="4" name="Grafik 3">
+            <a:extLst>
+              <a:ext uri="{FF2B5EF4-FFF2-40B4-BE49-F238E27FC236}">
+                <a16:creationId xmlns:a16="http://schemas.microsoft.com/office/drawing/2014/main" id="{869A3430-6CBC-4CB9-8676-812401A19C29}"/>
+              </a:ext>
+            </a:extLst>
+          </p:cNvPr>
+          <p:cNvPicPr>
+            <a:picLocks noChangeAspect="1"/>
+          </p:cNvPicPr>
+          <p:nvPr/>
+        </p:nvPicPr>
+        <p:blipFill>
+          <a:blip r:embed="rId2">
+            <a:extLst>
+              <a:ext uri="{28A0092B-C50C-407E-A947-70E740481C1C}">
+                <a14:useLocalDpi xmlns:a14="http://schemas.microsoft.com/office/drawing/2010/main" val="0"/>
+              </a:ext>
+            </a:extLst>
+          </a:blip>
+          <a:stretch>
+            <a:fillRect/>
+          </a:stretch>
+        </p:blipFill>
+        <p:spPr>
+          <a:xfrm>
+            <a:off x="3367191" y="655588"/>
+            <a:ext cx="5914817" cy="5546824"/>
+          </a:xfrm>
+          <a:prstGeom prst="rect">
+            <a:avLst/>
+          </a:prstGeom>
+        </p:spPr>
+      </p:pic>
+    </p:spTree>
+    <p:extLst>
+      <p:ext uri="{BB962C8B-B14F-4D97-AF65-F5344CB8AC3E}">
+        <p14:creationId xmlns:p14="http://schemas.microsoft.com/office/powerpoint/2010/main" val="2009501012"/>
+      </p:ext>
+    </p:extLst>
+  </p:cSld>
+  <p:clrMapOvr>
+    <a:masterClrMapping/>
+  </p:clrMapOvr>
+</p:sld>
+</file>
+
+<file path=ppt/slides/slide9.xml><?xml version="1.0" encoding="utf-8"?>
+<p:sld xmlns:a="http://schemas.openxmlformats.org/drawingml/2006/main" xmlns:r="http://schemas.openxmlformats.org/officeDocument/2006/relationships" xmlns:p="http://schemas.openxmlformats.org/presentationml/2006/main">
+  <p:cSld>
+    <p:spTree>
+      <p:nvGrpSpPr>
+        <p:cNvPr id="1" name=""/>
+        <p:cNvGrpSpPr/>
+        <p:nvPr/>
+      </p:nvGrpSpPr>
+      <p:grpSpPr>
+        <a:xfrm>
+          <a:off x="0" y="0"/>
+          <a:ext cx="0" cy="0"/>
+          <a:chOff x="0" y="0"/>
+          <a:chExt cx="0" cy="0"/>
+        </a:xfrm>
+      </p:grpSpPr>
+      <p:sp>
+        <p:nvSpPr>
+          <p:cNvPr id="2" name="Fußzeilenplatzhalter 1">
+            <a:extLst>
+              <a:ext uri="{FF2B5EF4-FFF2-40B4-BE49-F238E27FC236}">
+                <a16:creationId xmlns:a16="http://schemas.microsoft.com/office/drawing/2014/main" id="{699FA65A-A38D-4563-BC14-4DFF4B140E9E}"/>
+              </a:ext>
+            </a:extLst>
+          </p:cNvPr>
+          <p:cNvSpPr>
+            <a:spLocks noGrp="1"/>
+          </p:cNvSpPr>
+          <p:nvPr>
+            <p:ph type="ftr" sz="quarter" idx="11"/>
+          </p:nvPr>
+        </p:nvSpPr>
+        <p:spPr/>
+        <p:txBody>
+          <a:bodyPr/>
+          <a:lstStyle/>
+          <a:p>
+            <a:r>
+              <a:rPr lang="de-DE" dirty="0"/>
+              <a:t>Benutzerprofil pflegen</a:t>
+            </a:r>
+          </a:p>
+        </p:txBody>
+      </p:sp>
+      <p:pic>
+        <p:nvPicPr>
+          <p:cNvPr id="4" name="Grafik 3">
+            <a:extLst>
+              <a:ext uri="{FF2B5EF4-FFF2-40B4-BE49-F238E27FC236}">
+                <a16:creationId xmlns:a16="http://schemas.microsoft.com/office/drawing/2014/main" id="{C199F01B-1DD4-4468-A4F8-86BD74247A4E}"/>
+              </a:ext>
+            </a:extLst>
+          </p:cNvPr>
+          <p:cNvPicPr>
+            <a:picLocks noChangeAspect="1"/>
+          </p:cNvPicPr>
+          <p:nvPr/>
+        </p:nvPicPr>
+        <p:blipFill>
+          <a:blip r:embed="rId2">
+            <a:extLst>
+              <a:ext uri="{28A0092B-C50C-407E-A947-70E740481C1C}">
+                <a14:useLocalDpi xmlns:a14="http://schemas.microsoft.com/office/drawing/2010/main" val="0"/>
+              </a:ext>
+            </a:extLst>
+          </a:blip>
+          <a:stretch>
+            <a:fillRect/>
+          </a:stretch>
+        </p:blipFill>
+        <p:spPr>
+          <a:xfrm>
+            <a:off x="3389243" y="512763"/>
+            <a:ext cx="5618093" cy="5346500"/>
+          </a:xfrm>
+          <a:prstGeom prst="rect">
+            <a:avLst/>
+          </a:prstGeom>
+        </p:spPr>
+      </p:pic>
+    </p:spTree>
+    <p:extLst>
+      <p:ext uri="{BB962C8B-B14F-4D97-AF65-F5344CB8AC3E}">
+        <p14:creationId xmlns:p14="http://schemas.microsoft.com/office/powerpoint/2010/main" val="1203290354"/>
       </p:ext>
     </p:extLst>
   </p:cSld>

</xml_diff>

<commit_message>
Pfeil zwischen Benutzerprofil ansehen und Band anlegen aktualisiert
</commit_message>
<xml_diff>
--- a/Projektdokumentation/MockflowSoundmachine.pptx
+++ b/Projektdokumentation/MockflowSoundmachine.pptx
@@ -4122,6 +4122,7 @@
             <a:avLst/>
           </a:prstGeom>
           <a:ln>
+            <a:headEnd type="triangle"/>
             <a:tailEnd type="triangle"/>
           </a:ln>
         </p:spPr>
@@ -4608,7 +4609,7 @@
         <p:spPr>
           <a:xfrm>
             <a:off x="8097210" y="4490684"/>
-            <a:ext cx="1317259" cy="276999"/>
+            <a:ext cx="1670668" cy="461665"/>
           </a:xfrm>
           <a:prstGeom prst="rect">
             <a:avLst/>
@@ -4623,7 +4624,7 @@
           <a:p>
             <a:r>
               <a:rPr lang="de-DE" sz="1200" dirty="0"/>
-              <a:t>Band anlegen</a:t>
+              <a:t>Band anlegen/speichern</a:t>
             </a:r>
           </a:p>
         </p:txBody>

</xml_diff>